<commit_message>
Implemented parentdies in repscheme, shist in golgstats, created subroutine golr_digest to process golr for mismatches and period for use in python.
</commit_message>
<xml_diff>
--- a/docs/Configurations.pptx
+++ b/docs/Configurations.pptx
@@ -200,7 +200,7 @@
           <a:p>
             <a:fld id="{9DF8E8A1-7F5E-B946-B0BF-5A810BC7CA04}" type="datetimeFigureOut">
               <a:rPr lang="en-US" smtClean="0"/>
-              <a:t>12/13/18</a:t>
+              <a:t>8/15/19</a:t>
             </a:fld>
             <a:endParaRPr lang="en-US"/>
           </a:p>
@@ -898,7 +898,7 @@
           <a:p>
             <a:fld id="{B3C8DAF2-8992-D940-951E-CD71294AEB5F}" type="datetimeFigureOut">
               <a:rPr lang="en-US" smtClean="0"/>
-              <a:t>12/13/18</a:t>
+              <a:t>8/15/19</a:t>
             </a:fld>
             <a:endParaRPr lang="en-US"/>
           </a:p>
@@ -1068,7 +1068,7 @@
           <a:p>
             <a:fld id="{B3C8DAF2-8992-D940-951E-CD71294AEB5F}" type="datetimeFigureOut">
               <a:rPr lang="en-US" smtClean="0"/>
-              <a:t>12/13/18</a:t>
+              <a:t>8/15/19</a:t>
             </a:fld>
             <a:endParaRPr lang="en-US"/>
           </a:p>
@@ -1248,7 +1248,7 @@
           <a:p>
             <a:fld id="{B3C8DAF2-8992-D940-951E-CD71294AEB5F}" type="datetimeFigureOut">
               <a:rPr lang="en-US" smtClean="0"/>
-              <a:t>12/13/18</a:t>
+              <a:t>8/15/19</a:t>
             </a:fld>
             <a:endParaRPr lang="en-US"/>
           </a:p>
@@ -1418,7 +1418,7 @@
           <a:p>
             <a:fld id="{B3C8DAF2-8992-D940-951E-CD71294AEB5F}" type="datetimeFigureOut">
               <a:rPr lang="en-US" smtClean="0"/>
-              <a:t>12/13/18</a:t>
+              <a:t>8/15/19</a:t>
             </a:fld>
             <a:endParaRPr lang="en-US"/>
           </a:p>
@@ -1662,7 +1662,7 @@
           <a:p>
             <a:fld id="{B3C8DAF2-8992-D940-951E-CD71294AEB5F}" type="datetimeFigureOut">
               <a:rPr lang="en-US" smtClean="0"/>
-              <a:t>12/13/18</a:t>
+              <a:t>8/15/19</a:t>
             </a:fld>
             <a:endParaRPr lang="en-US"/>
           </a:p>
@@ -1894,7 +1894,7 @@
           <a:p>
             <a:fld id="{B3C8DAF2-8992-D940-951E-CD71294AEB5F}" type="datetimeFigureOut">
               <a:rPr lang="en-US" smtClean="0"/>
-              <a:t>12/13/18</a:t>
+              <a:t>8/15/19</a:t>
             </a:fld>
             <a:endParaRPr lang="en-US"/>
           </a:p>
@@ -2261,7 +2261,7 @@
           <a:p>
             <a:fld id="{B3C8DAF2-8992-D940-951E-CD71294AEB5F}" type="datetimeFigureOut">
               <a:rPr lang="en-US" smtClean="0"/>
-              <a:t>12/13/18</a:t>
+              <a:t>8/15/19</a:t>
             </a:fld>
             <a:endParaRPr lang="en-US"/>
           </a:p>
@@ -2379,7 +2379,7 @@
           <a:p>
             <a:fld id="{B3C8DAF2-8992-D940-951E-CD71294AEB5F}" type="datetimeFigureOut">
               <a:rPr lang="en-US" smtClean="0"/>
-              <a:t>12/13/18</a:t>
+              <a:t>8/15/19</a:t>
             </a:fld>
             <a:endParaRPr lang="en-US"/>
           </a:p>
@@ -2474,7 +2474,7 @@
           <a:p>
             <a:fld id="{B3C8DAF2-8992-D940-951E-CD71294AEB5F}" type="datetimeFigureOut">
               <a:rPr lang="en-US" smtClean="0"/>
-              <a:t>12/13/18</a:t>
+              <a:t>8/15/19</a:t>
             </a:fld>
             <a:endParaRPr lang="en-US"/>
           </a:p>
@@ -2751,7 +2751,7 @@
           <a:p>
             <a:fld id="{B3C8DAF2-8992-D940-951E-CD71294AEB5F}" type="datetimeFigureOut">
               <a:rPr lang="en-US" smtClean="0"/>
-              <a:t>12/13/18</a:t>
+              <a:t>8/15/19</a:t>
             </a:fld>
             <a:endParaRPr lang="en-US"/>
           </a:p>
@@ -3008,7 +3008,7 @@
           <a:p>
             <a:fld id="{B3C8DAF2-8992-D940-951E-CD71294AEB5F}" type="datetimeFigureOut">
               <a:rPr lang="en-US" smtClean="0"/>
-              <a:t>12/13/18</a:t>
+              <a:t>8/15/19</a:t>
             </a:fld>
             <a:endParaRPr lang="en-US"/>
           </a:p>
@@ -3221,7 +3221,7 @@
           <a:p>
             <a:fld id="{B3C8DAF2-8992-D940-951E-CD71294AEB5F}" type="datetimeFigureOut">
               <a:rPr lang="en-US" smtClean="0"/>
-              <a:t>12/13/18</a:t>
+              <a:t>8/15/19</a:t>
             </a:fld>
             <a:endParaRPr lang="en-US"/>
           </a:p>
@@ -3808,6 +3808,9 @@
             <a:prstGeom prst="ellipse">
               <a:avLst/>
             </a:prstGeom>
+            <a:solidFill>
+              <a:srgbClr val="92D050"/>
+            </a:solidFill>
             <a:ln>
               <a:solidFill>
                 <a:srgbClr val="0070C0"/>
@@ -5780,6 +5783,9 @@
             <a:prstGeom prst="ellipse">
               <a:avLst/>
             </a:prstGeom>
+            <a:solidFill>
+              <a:srgbClr val="92D050"/>
+            </a:solidFill>
             <a:ln>
               <a:solidFill>
                 <a:srgbClr val="0070C0"/>
@@ -6433,7 +6439,7 @@
               <a:avLst/>
             </a:prstGeom>
             <a:solidFill>
-              <a:srgbClr val="0070C0"/>
+              <a:srgbClr val="92D050"/>
             </a:solidFill>
             <a:ln>
               <a:noFill/>
@@ -7997,7 +8003,7 @@
                 <a:avLst/>
               </a:prstGeom>
               <a:solidFill>
-                <a:srgbClr val="0070C0"/>
+                <a:srgbClr val="92D050"/>
               </a:solidFill>
               <a:ln>
                 <a:noFill/>
@@ -9431,7 +9437,7 @@
         </p:nvCxnSpPr>
         <p:spPr>
           <a:xfrm flipV="1">
-            <a:off x="5005606" y="2323282"/>
+            <a:off x="1646687" y="2579676"/>
             <a:ext cx="320706" cy="473314"/>
           </a:xfrm>
           <a:prstGeom prst="straightConnector1">
@@ -13271,6 +13277,90 @@
           </p:txBody>
         </p:sp>
       </p:grpSp>
+      <p:cxnSp>
+        <p:nvCxnSpPr>
+          <p:cNvPr id="227" name="Straight Arrow Connector 226">
+            <a:extLst>
+              <a:ext uri="{FF2B5EF4-FFF2-40B4-BE49-F238E27FC236}">
+                <a16:creationId xmlns:a16="http://schemas.microsoft.com/office/drawing/2014/main" id="{6EB2239D-469F-614F-A99B-42BFFA146FED}"/>
+              </a:ext>
+            </a:extLst>
+          </p:cNvPr>
+          <p:cNvCxnSpPr>
+            <a:cxnSpLocks/>
+          </p:cNvCxnSpPr>
+          <p:nvPr/>
+        </p:nvCxnSpPr>
+        <p:spPr>
+          <a:xfrm flipV="1">
+            <a:off x="1675606" y="7099109"/>
+            <a:ext cx="320706" cy="473314"/>
+          </a:xfrm>
+          <a:prstGeom prst="straightConnector1">
+            <a:avLst/>
+          </a:prstGeom>
+          <a:ln>
+            <a:headEnd type="triangle" w="med" len="med"/>
+            <a:tailEnd type="triangle" w="med" len="med"/>
+          </a:ln>
+        </p:spPr>
+        <p:style>
+          <a:lnRef idx="1">
+            <a:schemeClr val="accent1"/>
+          </a:lnRef>
+          <a:fillRef idx="0">
+            <a:schemeClr val="accent1"/>
+          </a:fillRef>
+          <a:effectRef idx="0">
+            <a:schemeClr val="accent1"/>
+          </a:effectRef>
+          <a:fontRef idx="minor">
+            <a:schemeClr val="tx1"/>
+          </a:fontRef>
+        </p:style>
+      </p:cxnSp>
+      <p:cxnSp>
+        <p:nvCxnSpPr>
+          <p:cNvPr id="228" name="Straight Arrow Connector 227">
+            <a:extLst>
+              <a:ext uri="{FF2B5EF4-FFF2-40B4-BE49-F238E27FC236}">
+                <a16:creationId xmlns:a16="http://schemas.microsoft.com/office/drawing/2014/main" id="{E0B50871-91FC-5941-B406-7AE67CAD6E67}"/>
+              </a:ext>
+            </a:extLst>
+          </p:cNvPr>
+          <p:cNvCxnSpPr>
+            <a:cxnSpLocks/>
+          </p:cNvCxnSpPr>
+          <p:nvPr/>
+        </p:nvCxnSpPr>
+        <p:spPr>
+          <a:xfrm flipV="1">
+            <a:off x="1654755" y="5152079"/>
+            <a:ext cx="320706" cy="473314"/>
+          </a:xfrm>
+          <a:prstGeom prst="straightConnector1">
+            <a:avLst/>
+          </a:prstGeom>
+          <a:ln>
+            <a:headEnd type="triangle" w="med" len="med"/>
+            <a:tailEnd type="triangle" w="med" len="med"/>
+          </a:ln>
+        </p:spPr>
+        <p:style>
+          <a:lnRef idx="1">
+            <a:schemeClr val="accent1"/>
+          </a:lnRef>
+          <a:fillRef idx="0">
+            <a:schemeClr val="accent1"/>
+          </a:fillRef>
+          <a:effectRef idx="0">
+            <a:schemeClr val="accent1"/>
+          </a:effectRef>
+          <a:fontRef idx="minor">
+            <a:schemeClr val="tx1"/>
+          </a:fontRef>
+        </p:style>
+      </p:cxnSp>
     </p:spTree>
     <p:extLst>
       <p:ext uri="{BB962C8B-B14F-4D97-AF65-F5344CB8AC3E}">

</xml_diff>